<commit_message>
modify the document and the flow chart
</commit_message>
<xml_diff>
--- a/流程图.pptx
+++ b/流程图.pptx
@@ -6,6 +6,7 @@
   </p:sldMasterIdLst>
   <p:sldIdLst>
     <p:sldId id="256" r:id="rId2"/>
+    <p:sldId id="257" r:id="rId3"/>
   </p:sldIdLst>
   <p:sldSz cx="12192000" cy="6858000"/>
   <p:notesSz cx="6858000" cy="9144000"/>
@@ -104,6 +105,11 @@
       </a:defRPr>
     </a:lvl9pPr>
   </p:defaultTextStyle>
+  <p:extLst>
+    <p:ext uri="{EFAFB233-063F-42B5-8137-9DF3F51BA10A}">
+      <p15:sldGuideLst xmlns:p15="http://schemas.microsoft.com/office/powerpoint/2012/main"/>
+    </p:ext>
+  </p:extLst>
 </p:presentation>
 </file>
 
@@ -238,7 +244,7 @@
           <a:p>
             <a:fld id="{B182746D-4A24-4350-A4A8-536161BEC7E9}" type="datetimeFigureOut">
               <a:rPr lang="zh-CN" altLang="en-US" smtClean="0"/>
-              <a:t>2024/1/5</a:t>
+              <a:t>2024/1/6</a:t>
             </a:fld>
             <a:endParaRPr lang="zh-CN" altLang="en-US"/>
           </a:p>
@@ -408,7 +414,7 @@
           <a:p>
             <a:fld id="{B182746D-4A24-4350-A4A8-536161BEC7E9}" type="datetimeFigureOut">
               <a:rPr lang="zh-CN" altLang="en-US" smtClean="0"/>
-              <a:t>2024/1/5</a:t>
+              <a:t>2024/1/6</a:t>
             </a:fld>
             <a:endParaRPr lang="zh-CN" altLang="en-US"/>
           </a:p>
@@ -588,7 +594,7 @@
           <a:p>
             <a:fld id="{B182746D-4A24-4350-A4A8-536161BEC7E9}" type="datetimeFigureOut">
               <a:rPr lang="zh-CN" altLang="en-US" smtClean="0"/>
-              <a:t>2024/1/5</a:t>
+              <a:t>2024/1/6</a:t>
             </a:fld>
             <a:endParaRPr lang="zh-CN" altLang="en-US"/>
           </a:p>
@@ -758,7 +764,7 @@
           <a:p>
             <a:fld id="{B182746D-4A24-4350-A4A8-536161BEC7E9}" type="datetimeFigureOut">
               <a:rPr lang="zh-CN" altLang="en-US" smtClean="0"/>
-              <a:t>2024/1/5</a:t>
+              <a:t>2024/1/6</a:t>
             </a:fld>
             <a:endParaRPr lang="zh-CN" altLang="en-US"/>
           </a:p>
@@ -1004,7 +1010,7 @@
           <a:p>
             <a:fld id="{B182746D-4A24-4350-A4A8-536161BEC7E9}" type="datetimeFigureOut">
               <a:rPr lang="zh-CN" altLang="en-US" smtClean="0"/>
-              <a:t>2024/1/5</a:t>
+              <a:t>2024/1/6</a:t>
             </a:fld>
             <a:endParaRPr lang="zh-CN" altLang="en-US"/>
           </a:p>
@@ -1236,7 +1242,7 @@
           <a:p>
             <a:fld id="{B182746D-4A24-4350-A4A8-536161BEC7E9}" type="datetimeFigureOut">
               <a:rPr lang="zh-CN" altLang="en-US" smtClean="0"/>
-              <a:t>2024/1/5</a:t>
+              <a:t>2024/1/6</a:t>
             </a:fld>
             <a:endParaRPr lang="zh-CN" altLang="en-US"/>
           </a:p>
@@ -1603,7 +1609,7 @@
           <a:p>
             <a:fld id="{B182746D-4A24-4350-A4A8-536161BEC7E9}" type="datetimeFigureOut">
               <a:rPr lang="zh-CN" altLang="en-US" smtClean="0"/>
-              <a:t>2024/1/5</a:t>
+              <a:t>2024/1/6</a:t>
             </a:fld>
             <a:endParaRPr lang="zh-CN" altLang="en-US"/>
           </a:p>
@@ -1721,7 +1727,7 @@
           <a:p>
             <a:fld id="{B182746D-4A24-4350-A4A8-536161BEC7E9}" type="datetimeFigureOut">
               <a:rPr lang="zh-CN" altLang="en-US" smtClean="0"/>
-              <a:t>2024/1/5</a:t>
+              <a:t>2024/1/6</a:t>
             </a:fld>
             <a:endParaRPr lang="zh-CN" altLang="en-US"/>
           </a:p>
@@ -1816,7 +1822,7 @@
           <a:p>
             <a:fld id="{B182746D-4A24-4350-A4A8-536161BEC7E9}" type="datetimeFigureOut">
               <a:rPr lang="zh-CN" altLang="en-US" smtClean="0"/>
-              <a:t>2024/1/5</a:t>
+              <a:t>2024/1/6</a:t>
             </a:fld>
             <a:endParaRPr lang="zh-CN" altLang="en-US"/>
           </a:p>
@@ -2093,7 +2099,7 @@
           <a:p>
             <a:fld id="{B182746D-4A24-4350-A4A8-536161BEC7E9}" type="datetimeFigureOut">
               <a:rPr lang="zh-CN" altLang="en-US" smtClean="0"/>
-              <a:t>2024/1/5</a:t>
+              <a:t>2024/1/6</a:t>
             </a:fld>
             <a:endParaRPr lang="zh-CN" altLang="en-US"/>
           </a:p>
@@ -2346,7 +2352,7 @@
           <a:p>
             <a:fld id="{B182746D-4A24-4350-A4A8-536161BEC7E9}" type="datetimeFigureOut">
               <a:rPr lang="zh-CN" altLang="en-US" smtClean="0"/>
-              <a:t>2024/1/5</a:t>
+              <a:t>2024/1/6</a:t>
             </a:fld>
             <a:endParaRPr lang="zh-CN" altLang="en-US"/>
           </a:p>
@@ -2559,7 +2565,7 @@
           <a:p>
             <a:fld id="{B182746D-4A24-4350-A4A8-536161BEC7E9}" type="datetimeFigureOut">
               <a:rPr lang="zh-CN" altLang="en-US" smtClean="0"/>
-              <a:t>2024/1/5</a:t>
+              <a:t>2024/1/6</a:t>
             </a:fld>
             <a:endParaRPr lang="zh-CN" altLang="en-US"/>
           </a:p>
@@ -3770,6 +3776,323 @@
 </p:sld>
 </file>
 
+<file path=ppt/slides/slide2.xml><?xml version="1.0" encoding="utf-8"?>
+<p:sld xmlns:a="http://schemas.openxmlformats.org/drawingml/2006/main" xmlns:r="http://schemas.openxmlformats.org/officeDocument/2006/relationships" xmlns:p="http://schemas.openxmlformats.org/presentationml/2006/main">
+  <p:cSld>
+    <p:spTree>
+      <p:nvGrpSpPr>
+        <p:cNvPr id="1" name=""/>
+        <p:cNvGrpSpPr/>
+        <p:nvPr/>
+      </p:nvGrpSpPr>
+      <p:grpSpPr>
+        <a:xfrm>
+          <a:off x="0" y="0"/>
+          <a:ext cx="0" cy="0"/>
+          <a:chOff x="0" y="0"/>
+          <a:chExt cx="0" cy="0"/>
+        </a:xfrm>
+      </p:grpSpPr>
+      <p:sp>
+        <p:nvSpPr>
+          <p:cNvPr id="2" name="矩形 1"/>
+          <p:cNvSpPr/>
+          <p:nvPr/>
+        </p:nvSpPr>
+        <p:spPr>
+          <a:xfrm>
+            <a:off x="3791335" y="1287624"/>
+            <a:ext cx="3477212" cy="587828"/>
+          </a:xfrm>
+          <a:prstGeom prst="rect">
+            <a:avLst/>
+          </a:prstGeom>
+          <a:ln w="19050"/>
+        </p:spPr>
+        <p:style>
+          <a:lnRef idx="2">
+            <a:schemeClr val="dk1"/>
+          </a:lnRef>
+          <a:fillRef idx="1">
+            <a:schemeClr val="lt1"/>
+          </a:fillRef>
+          <a:effectRef idx="0">
+            <a:schemeClr val="dk1"/>
+          </a:effectRef>
+          <a:fontRef idx="minor">
+            <a:schemeClr val="dk1"/>
+          </a:fontRef>
+        </p:style>
+        <p:txBody>
+          <a:bodyPr rtlCol="0" anchor="ctr"/>
+          <a:lstStyle/>
+          <a:p>
+            <a:pPr algn="ctr"/>
+            <a:r>
+              <a:rPr lang="zh-CN" altLang="en-US" dirty="0" smtClean="0"/>
+              <a:t>定义带权重无向图的邻接矩阵</a:t>
+            </a:r>
+            <a:endParaRPr lang="zh-CN" altLang="en-US" dirty="0"/>
+          </a:p>
+        </p:txBody>
+      </p:sp>
+      <p:sp>
+        <p:nvSpPr>
+          <p:cNvPr id="3" name="矩形 2"/>
+          <p:cNvSpPr/>
+          <p:nvPr/>
+        </p:nvSpPr>
+        <p:spPr>
+          <a:xfrm>
+            <a:off x="3791335" y="2242457"/>
+            <a:ext cx="3477212" cy="587828"/>
+          </a:xfrm>
+          <a:prstGeom prst="rect">
+            <a:avLst/>
+          </a:prstGeom>
+          <a:ln w="19050"/>
+        </p:spPr>
+        <p:style>
+          <a:lnRef idx="2">
+            <a:schemeClr val="dk1"/>
+          </a:lnRef>
+          <a:fillRef idx="1">
+            <a:schemeClr val="lt1"/>
+          </a:fillRef>
+          <a:effectRef idx="0">
+            <a:schemeClr val="dk1"/>
+          </a:effectRef>
+          <a:fontRef idx="minor">
+            <a:schemeClr val="dk1"/>
+          </a:fontRef>
+        </p:style>
+        <p:txBody>
+          <a:bodyPr rtlCol="0" anchor="ctr"/>
+          <a:lstStyle/>
+          <a:p>
+            <a:pPr algn="ctr"/>
+            <a:r>
+              <a:rPr lang="zh-CN" altLang="en-US" dirty="0" smtClean="0"/>
+              <a:t>绘制无向图与表格</a:t>
+            </a:r>
+            <a:endParaRPr lang="zh-CN" altLang="en-US" dirty="0"/>
+          </a:p>
+        </p:txBody>
+      </p:sp>
+      <p:sp>
+        <p:nvSpPr>
+          <p:cNvPr id="4" name="矩形 3"/>
+          <p:cNvSpPr/>
+          <p:nvPr/>
+        </p:nvSpPr>
+        <p:spPr>
+          <a:xfrm>
+            <a:off x="3791335" y="3197290"/>
+            <a:ext cx="3477212" cy="587828"/>
+          </a:xfrm>
+          <a:prstGeom prst="rect">
+            <a:avLst/>
+          </a:prstGeom>
+          <a:ln w="19050"/>
+        </p:spPr>
+        <p:style>
+          <a:lnRef idx="2">
+            <a:schemeClr val="dk1"/>
+          </a:lnRef>
+          <a:fillRef idx="1">
+            <a:schemeClr val="lt1"/>
+          </a:fillRef>
+          <a:effectRef idx="0">
+            <a:schemeClr val="dk1"/>
+          </a:effectRef>
+          <a:fontRef idx="minor">
+            <a:schemeClr val="dk1"/>
+          </a:fontRef>
+        </p:style>
+        <p:txBody>
+          <a:bodyPr rtlCol="0" anchor="ctr"/>
+          <a:lstStyle/>
+          <a:p>
+            <a:pPr algn="ctr"/>
+            <a:r>
+              <a:rPr lang="en-US" altLang="zh-CN" dirty="0" smtClean="0"/>
+              <a:t>Floyd</a:t>
+            </a:r>
+            <a:r>
+              <a:rPr lang="zh-CN" altLang="en-US" dirty="0" smtClean="0"/>
+              <a:t>算法</a:t>
+            </a:r>
+            <a:endParaRPr lang="zh-CN" altLang="en-US" dirty="0"/>
+          </a:p>
+        </p:txBody>
+      </p:sp>
+      <p:sp>
+        <p:nvSpPr>
+          <p:cNvPr id="5" name="矩形 4"/>
+          <p:cNvSpPr/>
+          <p:nvPr/>
+        </p:nvSpPr>
+        <p:spPr>
+          <a:xfrm>
+            <a:off x="3791335" y="4152123"/>
+            <a:ext cx="3477212" cy="587828"/>
+          </a:xfrm>
+          <a:prstGeom prst="rect">
+            <a:avLst/>
+          </a:prstGeom>
+          <a:ln w="19050"/>
+        </p:spPr>
+        <p:style>
+          <a:lnRef idx="2">
+            <a:schemeClr val="dk1"/>
+          </a:lnRef>
+          <a:fillRef idx="1">
+            <a:schemeClr val="lt1"/>
+          </a:fillRef>
+          <a:effectRef idx="0">
+            <a:schemeClr val="dk1"/>
+          </a:effectRef>
+          <a:fontRef idx="minor">
+            <a:schemeClr val="dk1"/>
+          </a:fontRef>
+        </p:style>
+        <p:txBody>
+          <a:bodyPr rtlCol="0" anchor="ctr"/>
+          <a:lstStyle/>
+          <a:p>
+            <a:pPr algn="ctr"/>
+            <a:r>
+              <a:rPr lang="zh-CN" altLang="en-US" dirty="0" smtClean="0"/>
+              <a:t>输出所有路径</a:t>
+            </a:r>
+            <a:endParaRPr lang="zh-CN" altLang="en-US" dirty="0"/>
+          </a:p>
+        </p:txBody>
+      </p:sp>
+      <p:cxnSp>
+        <p:nvCxnSpPr>
+          <p:cNvPr id="7" name="直接箭头连接符 6"/>
+          <p:cNvCxnSpPr>
+            <a:stCxn id="2" idx="2"/>
+            <a:endCxn id="3" idx="0"/>
+          </p:cNvCxnSpPr>
+          <p:nvPr/>
+        </p:nvCxnSpPr>
+        <p:spPr>
+          <a:xfrm>
+            <a:off x="5529941" y="1875452"/>
+            <a:ext cx="0" cy="367005"/>
+          </a:xfrm>
+          <a:prstGeom prst="straightConnector1">
+            <a:avLst/>
+          </a:prstGeom>
+          <a:ln w="19050">
+            <a:solidFill>
+              <a:schemeClr val="tx1"/>
+            </a:solidFill>
+            <a:tailEnd type="triangle"/>
+          </a:ln>
+        </p:spPr>
+        <p:style>
+          <a:lnRef idx="1">
+            <a:schemeClr val="dk1"/>
+          </a:lnRef>
+          <a:fillRef idx="0">
+            <a:schemeClr val="dk1"/>
+          </a:fillRef>
+          <a:effectRef idx="0">
+            <a:schemeClr val="dk1"/>
+          </a:effectRef>
+          <a:fontRef idx="minor">
+            <a:schemeClr val="tx1"/>
+          </a:fontRef>
+        </p:style>
+      </p:cxnSp>
+      <p:cxnSp>
+        <p:nvCxnSpPr>
+          <p:cNvPr id="10" name="直接箭头连接符 9"/>
+          <p:cNvCxnSpPr/>
+          <p:nvPr/>
+        </p:nvCxnSpPr>
+        <p:spPr>
+          <a:xfrm>
+            <a:off x="5517498" y="3785118"/>
+            <a:ext cx="0" cy="367005"/>
+          </a:xfrm>
+          <a:prstGeom prst="straightConnector1">
+            <a:avLst/>
+          </a:prstGeom>
+          <a:ln w="19050">
+            <a:solidFill>
+              <a:schemeClr val="tx1"/>
+            </a:solidFill>
+            <a:tailEnd type="triangle"/>
+          </a:ln>
+        </p:spPr>
+        <p:style>
+          <a:lnRef idx="1">
+            <a:schemeClr val="dk1"/>
+          </a:lnRef>
+          <a:fillRef idx="0">
+            <a:schemeClr val="dk1"/>
+          </a:fillRef>
+          <a:effectRef idx="0">
+            <a:schemeClr val="dk1"/>
+          </a:effectRef>
+          <a:fontRef idx="minor">
+            <a:schemeClr val="tx1"/>
+          </a:fontRef>
+        </p:style>
+      </p:cxnSp>
+      <p:cxnSp>
+        <p:nvCxnSpPr>
+          <p:cNvPr id="11" name="直接箭头连接符 10"/>
+          <p:cNvCxnSpPr/>
+          <p:nvPr/>
+        </p:nvCxnSpPr>
+        <p:spPr>
+          <a:xfrm>
+            <a:off x="5517498" y="2830285"/>
+            <a:ext cx="0" cy="367005"/>
+          </a:xfrm>
+          <a:prstGeom prst="straightConnector1">
+            <a:avLst/>
+          </a:prstGeom>
+          <a:ln w="19050">
+            <a:solidFill>
+              <a:schemeClr val="tx1"/>
+            </a:solidFill>
+            <a:tailEnd type="triangle"/>
+          </a:ln>
+        </p:spPr>
+        <p:style>
+          <a:lnRef idx="1">
+            <a:schemeClr val="dk1"/>
+          </a:lnRef>
+          <a:fillRef idx="0">
+            <a:schemeClr val="dk1"/>
+          </a:fillRef>
+          <a:effectRef idx="0">
+            <a:schemeClr val="dk1"/>
+          </a:effectRef>
+          <a:fontRef idx="minor">
+            <a:schemeClr val="tx1"/>
+          </a:fontRef>
+        </p:style>
+      </p:cxnSp>
+    </p:spTree>
+    <p:extLst>
+      <p:ext uri="{BB962C8B-B14F-4D97-AF65-F5344CB8AC3E}">
+        <p14:creationId xmlns:p14="http://schemas.microsoft.com/office/powerpoint/2010/main" val="1424254740"/>
+      </p:ext>
+    </p:extLst>
+  </p:cSld>
+  <p:clrMapOvr>
+    <a:masterClrMapping/>
+  </p:clrMapOvr>
+</p:sld>
+</file>
+
 <file path=ppt/theme/theme1.xml><?xml version="1.0" encoding="utf-8"?>
 <a:theme xmlns:a="http://schemas.openxmlformats.org/drawingml/2006/main" name="Office 主题​​">
   <a:themeElements>
@@ -4041,6 +4364,25 @@
         </a:fontRef>
       </a:style>
     </a:spDef>
+    <a:lnDef>
+      <a:spPr/>
+      <a:bodyPr/>
+      <a:lstStyle/>
+      <a:style>
+        <a:lnRef idx="1">
+          <a:schemeClr val="dk1"/>
+        </a:lnRef>
+        <a:fillRef idx="0">
+          <a:schemeClr val="dk1"/>
+        </a:fillRef>
+        <a:effectRef idx="0">
+          <a:schemeClr val="dk1"/>
+        </a:effectRef>
+        <a:fontRef idx="minor">
+          <a:schemeClr val="tx1"/>
+        </a:fontRef>
+      </a:style>
+    </a:lnDef>
   </a:objectDefaults>
   <a:extraClrSchemeLst/>
   <a:extLst>

</xml_diff>